<commit_message>
Prognose in Meilensteintrendanalyse eingefügt
</commit_message>
<xml_diff>
--- a/Meilensteintrendanalyse.pptx
+++ b/Meilensteintrendanalyse.pptx
@@ -154,10 +154,9 @@
           </a:lstStyle>
           <a:p>
             <a:r>
-              <a:rPr lang="de-DE" smtClean="0"/>
+              <a:rPr lang="de-DE"/>
               <a:t>Titelmasterformat durch Klicken bearbeiten</a:t>
             </a:r>
-            <a:endParaRPr lang="de-DE"/>
           </a:p>
         </p:txBody>
       </p:sp>
@@ -219,10 +218,9 @@
           </a:lstStyle>
           <a:p>
             <a:r>
-              <a:rPr lang="de-DE" smtClean="0"/>
+              <a:rPr lang="de-DE"/>
               <a:t>Formatvorlage des Untertitelmasters durch Klicken bearbeiten</a:t>
             </a:r>
-            <a:endParaRPr lang="de-DE"/>
           </a:p>
         </p:txBody>
       </p:sp>
@@ -243,7 +241,7 @@
           <a:p>
             <a:fld id="{E6F0475F-9040-4CC5-8405-AE9948145E03}" type="datetimeFigureOut">
               <a:rPr lang="de-DE" smtClean="0"/>
-              <a:t>05.01.2017</a:t>
+              <a:t>07.01.2017</a:t>
             </a:fld>
             <a:endParaRPr lang="de-DE"/>
           </a:p>
@@ -337,10 +335,9 @@
           <a:lstStyle/>
           <a:p>
             <a:r>
-              <a:rPr lang="de-DE" smtClean="0"/>
+              <a:rPr lang="de-DE"/>
               <a:t>Titelmasterformat durch Klicken bearbeiten</a:t>
             </a:r>
-            <a:endParaRPr lang="de-DE"/>
           </a:p>
         </p:txBody>
       </p:sp>
@@ -361,38 +358,37 @@
           <a:p>
             <a:pPr lvl="0"/>
             <a:r>
-              <a:rPr lang="de-DE" smtClean="0"/>
+              <a:rPr lang="de-DE"/>
               <a:t>Textmasterformat bearbeiten</a:t>
             </a:r>
           </a:p>
           <a:p>
             <a:pPr lvl="1"/>
             <a:r>
-              <a:rPr lang="de-DE" smtClean="0"/>
+              <a:rPr lang="de-DE"/>
               <a:t>Zweite Ebene</a:t>
             </a:r>
           </a:p>
           <a:p>
             <a:pPr lvl="2"/>
             <a:r>
-              <a:rPr lang="de-DE" smtClean="0"/>
+              <a:rPr lang="de-DE"/>
               <a:t>Dritte Ebene</a:t>
             </a:r>
           </a:p>
           <a:p>
             <a:pPr lvl="3"/>
             <a:r>
-              <a:rPr lang="de-DE" smtClean="0"/>
+              <a:rPr lang="de-DE"/>
               <a:t>Vierte Ebene</a:t>
             </a:r>
           </a:p>
           <a:p>
             <a:pPr lvl="4"/>
             <a:r>
-              <a:rPr lang="de-DE" smtClean="0"/>
+              <a:rPr lang="de-DE"/>
               <a:t>Fünfte Ebene</a:t>
             </a:r>
-            <a:endParaRPr lang="de-DE"/>
           </a:p>
         </p:txBody>
       </p:sp>
@@ -413,7 +409,7 @@
           <a:p>
             <a:fld id="{E6F0475F-9040-4CC5-8405-AE9948145E03}" type="datetimeFigureOut">
               <a:rPr lang="de-DE" smtClean="0"/>
-              <a:t>05.01.2017</a:t>
+              <a:t>07.01.2017</a:t>
             </a:fld>
             <a:endParaRPr lang="de-DE"/>
           </a:p>
@@ -512,10 +508,9 @@
           <a:lstStyle/>
           <a:p>
             <a:r>
-              <a:rPr lang="de-DE" smtClean="0"/>
+              <a:rPr lang="de-DE"/>
               <a:t>Titelmasterformat durch Klicken bearbeiten</a:t>
             </a:r>
-            <a:endParaRPr lang="de-DE"/>
           </a:p>
         </p:txBody>
       </p:sp>
@@ -541,38 +536,37 @@
           <a:p>
             <a:pPr lvl="0"/>
             <a:r>
-              <a:rPr lang="de-DE" smtClean="0"/>
+              <a:rPr lang="de-DE"/>
               <a:t>Textmasterformat bearbeiten</a:t>
             </a:r>
           </a:p>
           <a:p>
             <a:pPr lvl="1"/>
             <a:r>
-              <a:rPr lang="de-DE" smtClean="0"/>
+              <a:rPr lang="de-DE"/>
               <a:t>Zweite Ebene</a:t>
             </a:r>
           </a:p>
           <a:p>
             <a:pPr lvl="2"/>
             <a:r>
-              <a:rPr lang="de-DE" smtClean="0"/>
+              <a:rPr lang="de-DE"/>
               <a:t>Dritte Ebene</a:t>
             </a:r>
           </a:p>
           <a:p>
             <a:pPr lvl="3"/>
             <a:r>
-              <a:rPr lang="de-DE" smtClean="0"/>
+              <a:rPr lang="de-DE"/>
               <a:t>Vierte Ebene</a:t>
             </a:r>
           </a:p>
           <a:p>
             <a:pPr lvl="4"/>
             <a:r>
-              <a:rPr lang="de-DE" smtClean="0"/>
+              <a:rPr lang="de-DE"/>
               <a:t>Fünfte Ebene</a:t>
             </a:r>
-            <a:endParaRPr lang="de-DE"/>
           </a:p>
         </p:txBody>
       </p:sp>
@@ -593,7 +587,7 @@
           <a:p>
             <a:fld id="{E6F0475F-9040-4CC5-8405-AE9948145E03}" type="datetimeFigureOut">
               <a:rPr lang="de-DE" smtClean="0"/>
-              <a:t>05.01.2017</a:t>
+              <a:t>07.01.2017</a:t>
             </a:fld>
             <a:endParaRPr lang="de-DE"/>
           </a:p>
@@ -687,10 +681,9 @@
           <a:lstStyle/>
           <a:p>
             <a:r>
-              <a:rPr lang="de-DE" smtClean="0"/>
+              <a:rPr lang="de-DE"/>
               <a:t>Titelmasterformat durch Klicken bearbeiten</a:t>
             </a:r>
-            <a:endParaRPr lang="de-DE"/>
           </a:p>
         </p:txBody>
       </p:sp>
@@ -711,38 +704,37 @@
           <a:p>
             <a:pPr lvl="0"/>
             <a:r>
-              <a:rPr lang="de-DE" smtClean="0"/>
+              <a:rPr lang="de-DE"/>
               <a:t>Textmasterformat bearbeiten</a:t>
             </a:r>
           </a:p>
           <a:p>
             <a:pPr lvl="1"/>
             <a:r>
-              <a:rPr lang="de-DE" smtClean="0"/>
+              <a:rPr lang="de-DE"/>
               <a:t>Zweite Ebene</a:t>
             </a:r>
           </a:p>
           <a:p>
             <a:pPr lvl="2"/>
             <a:r>
-              <a:rPr lang="de-DE" smtClean="0"/>
+              <a:rPr lang="de-DE"/>
               <a:t>Dritte Ebene</a:t>
             </a:r>
           </a:p>
           <a:p>
             <a:pPr lvl="3"/>
             <a:r>
-              <a:rPr lang="de-DE" smtClean="0"/>
+              <a:rPr lang="de-DE"/>
               <a:t>Vierte Ebene</a:t>
             </a:r>
           </a:p>
           <a:p>
             <a:pPr lvl="4"/>
             <a:r>
-              <a:rPr lang="de-DE" smtClean="0"/>
+              <a:rPr lang="de-DE"/>
               <a:t>Fünfte Ebene</a:t>
             </a:r>
-            <a:endParaRPr lang="de-DE"/>
           </a:p>
         </p:txBody>
       </p:sp>
@@ -763,7 +755,7 @@
           <a:p>
             <a:fld id="{E6F0475F-9040-4CC5-8405-AE9948145E03}" type="datetimeFigureOut">
               <a:rPr lang="de-DE" smtClean="0"/>
-              <a:t>05.01.2017</a:t>
+              <a:t>07.01.2017</a:t>
             </a:fld>
             <a:endParaRPr lang="de-DE"/>
           </a:p>
@@ -866,10 +858,9 @@
           </a:lstStyle>
           <a:p>
             <a:r>
-              <a:rPr lang="de-DE" smtClean="0"/>
+              <a:rPr lang="de-DE"/>
               <a:t>Titelmasterformat durch Klicken bearbeiten</a:t>
             </a:r>
-            <a:endParaRPr lang="de-DE"/>
           </a:p>
         </p:txBody>
       </p:sp>
@@ -986,7 +977,7 @@
           <a:p>
             <a:pPr lvl="0"/>
             <a:r>
-              <a:rPr lang="de-DE" smtClean="0"/>
+              <a:rPr lang="de-DE"/>
               <a:t>Textmasterformat bearbeiten</a:t>
             </a:r>
           </a:p>
@@ -1009,7 +1000,7 @@
           <a:p>
             <a:fld id="{E6F0475F-9040-4CC5-8405-AE9948145E03}" type="datetimeFigureOut">
               <a:rPr lang="de-DE" smtClean="0"/>
-              <a:t>05.01.2017</a:t>
+              <a:t>07.01.2017</a:t>
             </a:fld>
             <a:endParaRPr lang="de-DE"/>
           </a:p>
@@ -1103,10 +1094,9 @@
           <a:lstStyle/>
           <a:p>
             <a:r>
-              <a:rPr lang="de-DE" smtClean="0"/>
+              <a:rPr lang="de-DE"/>
               <a:t>Titelmasterformat durch Klicken bearbeiten</a:t>
             </a:r>
-            <a:endParaRPr lang="de-DE"/>
           </a:p>
         </p:txBody>
       </p:sp>
@@ -1132,38 +1122,37 @@
           <a:p>
             <a:pPr lvl="0"/>
             <a:r>
-              <a:rPr lang="de-DE" smtClean="0"/>
+              <a:rPr lang="de-DE"/>
               <a:t>Textmasterformat bearbeiten</a:t>
             </a:r>
           </a:p>
           <a:p>
             <a:pPr lvl="1"/>
             <a:r>
-              <a:rPr lang="de-DE" smtClean="0"/>
+              <a:rPr lang="de-DE"/>
               <a:t>Zweite Ebene</a:t>
             </a:r>
           </a:p>
           <a:p>
             <a:pPr lvl="2"/>
             <a:r>
-              <a:rPr lang="de-DE" smtClean="0"/>
+              <a:rPr lang="de-DE"/>
               <a:t>Dritte Ebene</a:t>
             </a:r>
           </a:p>
           <a:p>
             <a:pPr lvl="3"/>
             <a:r>
-              <a:rPr lang="de-DE" smtClean="0"/>
+              <a:rPr lang="de-DE"/>
               <a:t>Vierte Ebene</a:t>
             </a:r>
           </a:p>
           <a:p>
             <a:pPr lvl="4"/>
             <a:r>
-              <a:rPr lang="de-DE" smtClean="0"/>
+              <a:rPr lang="de-DE"/>
               <a:t>Fünfte Ebene</a:t>
             </a:r>
-            <a:endParaRPr lang="de-DE"/>
           </a:p>
         </p:txBody>
       </p:sp>
@@ -1189,38 +1178,37 @@
           <a:p>
             <a:pPr lvl="0"/>
             <a:r>
-              <a:rPr lang="de-DE" smtClean="0"/>
+              <a:rPr lang="de-DE"/>
               <a:t>Textmasterformat bearbeiten</a:t>
             </a:r>
           </a:p>
           <a:p>
             <a:pPr lvl="1"/>
             <a:r>
-              <a:rPr lang="de-DE" smtClean="0"/>
+              <a:rPr lang="de-DE"/>
               <a:t>Zweite Ebene</a:t>
             </a:r>
           </a:p>
           <a:p>
             <a:pPr lvl="2"/>
             <a:r>
-              <a:rPr lang="de-DE" smtClean="0"/>
+              <a:rPr lang="de-DE"/>
               <a:t>Dritte Ebene</a:t>
             </a:r>
           </a:p>
           <a:p>
             <a:pPr lvl="3"/>
             <a:r>
-              <a:rPr lang="de-DE" smtClean="0"/>
+              <a:rPr lang="de-DE"/>
               <a:t>Vierte Ebene</a:t>
             </a:r>
           </a:p>
           <a:p>
             <a:pPr lvl="4"/>
             <a:r>
-              <a:rPr lang="de-DE" smtClean="0"/>
+              <a:rPr lang="de-DE"/>
               <a:t>Fünfte Ebene</a:t>
             </a:r>
-            <a:endParaRPr lang="de-DE"/>
           </a:p>
         </p:txBody>
       </p:sp>
@@ -1241,7 +1229,7 @@
           <a:p>
             <a:fld id="{E6F0475F-9040-4CC5-8405-AE9948145E03}" type="datetimeFigureOut">
               <a:rPr lang="de-DE" smtClean="0"/>
-              <a:t>05.01.2017</a:t>
+              <a:t>07.01.2017</a:t>
             </a:fld>
             <a:endParaRPr lang="de-DE"/>
           </a:p>
@@ -1340,10 +1328,9 @@
           <a:lstStyle/>
           <a:p>
             <a:r>
-              <a:rPr lang="de-DE" smtClean="0"/>
+              <a:rPr lang="de-DE"/>
               <a:t>Titelmasterformat durch Klicken bearbeiten</a:t>
             </a:r>
-            <a:endParaRPr lang="de-DE"/>
           </a:p>
         </p:txBody>
       </p:sp>
@@ -1406,7 +1393,7 @@
           <a:p>
             <a:pPr lvl="0"/>
             <a:r>
-              <a:rPr lang="de-DE" smtClean="0"/>
+              <a:rPr lang="de-DE"/>
               <a:t>Textmasterformat bearbeiten</a:t>
             </a:r>
           </a:p>
@@ -1434,38 +1421,37 @@
           <a:p>
             <a:pPr lvl="0"/>
             <a:r>
-              <a:rPr lang="de-DE" smtClean="0"/>
+              <a:rPr lang="de-DE"/>
               <a:t>Textmasterformat bearbeiten</a:t>
             </a:r>
           </a:p>
           <a:p>
             <a:pPr lvl="1"/>
             <a:r>
-              <a:rPr lang="de-DE" smtClean="0"/>
+              <a:rPr lang="de-DE"/>
               <a:t>Zweite Ebene</a:t>
             </a:r>
           </a:p>
           <a:p>
             <a:pPr lvl="2"/>
             <a:r>
-              <a:rPr lang="de-DE" smtClean="0"/>
+              <a:rPr lang="de-DE"/>
               <a:t>Dritte Ebene</a:t>
             </a:r>
           </a:p>
           <a:p>
             <a:pPr lvl="3"/>
             <a:r>
-              <a:rPr lang="de-DE" smtClean="0"/>
+              <a:rPr lang="de-DE"/>
               <a:t>Vierte Ebene</a:t>
             </a:r>
           </a:p>
           <a:p>
             <a:pPr lvl="4"/>
             <a:r>
-              <a:rPr lang="de-DE" smtClean="0"/>
+              <a:rPr lang="de-DE"/>
               <a:t>Fünfte Ebene</a:t>
             </a:r>
-            <a:endParaRPr lang="de-DE"/>
           </a:p>
         </p:txBody>
       </p:sp>
@@ -1528,7 +1514,7 @@
           <a:p>
             <a:pPr lvl="0"/>
             <a:r>
-              <a:rPr lang="de-DE" smtClean="0"/>
+              <a:rPr lang="de-DE"/>
               <a:t>Textmasterformat bearbeiten</a:t>
             </a:r>
           </a:p>
@@ -1556,38 +1542,37 @@
           <a:p>
             <a:pPr lvl="0"/>
             <a:r>
-              <a:rPr lang="de-DE" smtClean="0"/>
+              <a:rPr lang="de-DE"/>
               <a:t>Textmasterformat bearbeiten</a:t>
             </a:r>
           </a:p>
           <a:p>
             <a:pPr lvl="1"/>
             <a:r>
-              <a:rPr lang="de-DE" smtClean="0"/>
+              <a:rPr lang="de-DE"/>
               <a:t>Zweite Ebene</a:t>
             </a:r>
           </a:p>
           <a:p>
             <a:pPr lvl="2"/>
             <a:r>
-              <a:rPr lang="de-DE" smtClean="0"/>
+              <a:rPr lang="de-DE"/>
               <a:t>Dritte Ebene</a:t>
             </a:r>
           </a:p>
           <a:p>
             <a:pPr lvl="3"/>
             <a:r>
-              <a:rPr lang="de-DE" smtClean="0"/>
+              <a:rPr lang="de-DE"/>
               <a:t>Vierte Ebene</a:t>
             </a:r>
           </a:p>
           <a:p>
             <a:pPr lvl="4"/>
             <a:r>
-              <a:rPr lang="de-DE" smtClean="0"/>
+              <a:rPr lang="de-DE"/>
               <a:t>Fünfte Ebene</a:t>
             </a:r>
-            <a:endParaRPr lang="de-DE"/>
           </a:p>
         </p:txBody>
       </p:sp>
@@ -1608,7 +1593,7 @@
           <a:p>
             <a:fld id="{E6F0475F-9040-4CC5-8405-AE9948145E03}" type="datetimeFigureOut">
               <a:rPr lang="de-DE" smtClean="0"/>
-              <a:t>05.01.2017</a:t>
+              <a:t>07.01.2017</a:t>
             </a:fld>
             <a:endParaRPr lang="de-DE"/>
           </a:p>
@@ -1702,10 +1687,9 @@
           <a:lstStyle/>
           <a:p>
             <a:r>
-              <a:rPr lang="de-DE" smtClean="0"/>
+              <a:rPr lang="de-DE"/>
               <a:t>Titelmasterformat durch Klicken bearbeiten</a:t>
             </a:r>
-            <a:endParaRPr lang="de-DE"/>
           </a:p>
         </p:txBody>
       </p:sp>
@@ -1726,7 +1710,7 @@
           <a:p>
             <a:fld id="{E6F0475F-9040-4CC5-8405-AE9948145E03}" type="datetimeFigureOut">
               <a:rPr lang="de-DE" smtClean="0"/>
-              <a:t>05.01.2017</a:t>
+              <a:t>07.01.2017</a:t>
             </a:fld>
             <a:endParaRPr lang="de-DE"/>
           </a:p>
@@ -1821,7 +1805,7 @@
           <a:p>
             <a:fld id="{E6F0475F-9040-4CC5-8405-AE9948145E03}" type="datetimeFigureOut">
               <a:rPr lang="de-DE" smtClean="0"/>
-              <a:t>05.01.2017</a:t>
+              <a:t>07.01.2017</a:t>
             </a:fld>
             <a:endParaRPr lang="de-DE"/>
           </a:p>
@@ -1924,10 +1908,9 @@
           </a:lstStyle>
           <a:p>
             <a:r>
-              <a:rPr lang="de-DE" smtClean="0"/>
+              <a:rPr lang="de-DE"/>
               <a:t>Titelmasterformat durch Klicken bearbeiten</a:t>
             </a:r>
-            <a:endParaRPr lang="de-DE"/>
           </a:p>
         </p:txBody>
       </p:sp>
@@ -1981,38 +1964,37 @@
           <a:p>
             <a:pPr lvl="0"/>
             <a:r>
-              <a:rPr lang="de-DE" smtClean="0"/>
+              <a:rPr lang="de-DE"/>
               <a:t>Textmasterformat bearbeiten</a:t>
             </a:r>
           </a:p>
           <a:p>
             <a:pPr lvl="1"/>
             <a:r>
-              <a:rPr lang="de-DE" smtClean="0"/>
+              <a:rPr lang="de-DE"/>
               <a:t>Zweite Ebene</a:t>
             </a:r>
           </a:p>
           <a:p>
             <a:pPr lvl="2"/>
             <a:r>
-              <a:rPr lang="de-DE" smtClean="0"/>
+              <a:rPr lang="de-DE"/>
               <a:t>Dritte Ebene</a:t>
             </a:r>
           </a:p>
           <a:p>
             <a:pPr lvl="3"/>
             <a:r>
-              <a:rPr lang="de-DE" smtClean="0"/>
+              <a:rPr lang="de-DE"/>
               <a:t>Vierte Ebene</a:t>
             </a:r>
           </a:p>
           <a:p>
             <a:pPr lvl="4"/>
             <a:r>
-              <a:rPr lang="de-DE" smtClean="0"/>
+              <a:rPr lang="de-DE"/>
               <a:t>Fünfte Ebene</a:t>
             </a:r>
-            <a:endParaRPr lang="de-DE"/>
           </a:p>
         </p:txBody>
       </p:sp>
@@ -2075,7 +2057,7 @@
           <a:p>
             <a:pPr lvl="0"/>
             <a:r>
-              <a:rPr lang="de-DE" smtClean="0"/>
+              <a:rPr lang="de-DE"/>
               <a:t>Textmasterformat bearbeiten</a:t>
             </a:r>
           </a:p>
@@ -2098,7 +2080,7 @@
           <a:p>
             <a:fld id="{E6F0475F-9040-4CC5-8405-AE9948145E03}" type="datetimeFigureOut">
               <a:rPr lang="de-DE" smtClean="0"/>
-              <a:t>05.01.2017</a:t>
+              <a:t>07.01.2017</a:t>
             </a:fld>
             <a:endParaRPr lang="de-DE"/>
           </a:p>
@@ -2201,10 +2183,9 @@
           </a:lstStyle>
           <a:p>
             <a:r>
-              <a:rPr lang="de-DE" smtClean="0"/>
+              <a:rPr lang="de-DE"/>
               <a:t>Titelmasterformat durch Klicken bearbeiten</a:t>
             </a:r>
-            <a:endParaRPr lang="de-DE"/>
           </a:p>
         </p:txBody>
       </p:sp>
@@ -2328,7 +2309,7 @@
           <a:p>
             <a:pPr lvl="0"/>
             <a:r>
-              <a:rPr lang="de-DE" smtClean="0"/>
+              <a:rPr lang="de-DE"/>
               <a:t>Textmasterformat bearbeiten</a:t>
             </a:r>
           </a:p>
@@ -2351,7 +2332,7 @@
           <a:p>
             <a:fld id="{E6F0475F-9040-4CC5-8405-AE9948145E03}" type="datetimeFigureOut">
               <a:rPr lang="de-DE" smtClean="0"/>
-              <a:t>05.01.2017</a:t>
+              <a:t>07.01.2017</a:t>
             </a:fld>
             <a:endParaRPr lang="de-DE"/>
           </a:p>
@@ -2460,10 +2441,9 @@
           <a:lstStyle/>
           <a:p>
             <a:r>
-              <a:rPr lang="de-DE" smtClean="0"/>
+              <a:rPr lang="de-DE"/>
               <a:t>Titelmasterformat durch Klicken bearbeiten</a:t>
             </a:r>
-            <a:endParaRPr lang="de-DE"/>
           </a:p>
         </p:txBody>
       </p:sp>
@@ -2494,38 +2474,37 @@
           <a:p>
             <a:pPr lvl="0"/>
             <a:r>
-              <a:rPr lang="de-DE" smtClean="0"/>
+              <a:rPr lang="de-DE"/>
               <a:t>Textmasterformat bearbeiten</a:t>
             </a:r>
           </a:p>
           <a:p>
             <a:pPr lvl="1"/>
             <a:r>
-              <a:rPr lang="de-DE" smtClean="0"/>
+              <a:rPr lang="de-DE"/>
               <a:t>Zweite Ebene</a:t>
             </a:r>
           </a:p>
           <a:p>
             <a:pPr lvl="2"/>
             <a:r>
-              <a:rPr lang="de-DE" smtClean="0"/>
+              <a:rPr lang="de-DE"/>
               <a:t>Dritte Ebene</a:t>
             </a:r>
           </a:p>
           <a:p>
             <a:pPr lvl="3"/>
             <a:r>
-              <a:rPr lang="de-DE" smtClean="0"/>
+              <a:rPr lang="de-DE"/>
               <a:t>Vierte Ebene</a:t>
             </a:r>
           </a:p>
           <a:p>
             <a:pPr lvl="4"/>
             <a:r>
-              <a:rPr lang="de-DE" smtClean="0"/>
+              <a:rPr lang="de-DE"/>
               <a:t>Fünfte Ebene</a:t>
             </a:r>
-            <a:endParaRPr lang="de-DE"/>
           </a:p>
         </p:txBody>
       </p:sp>
@@ -2564,7 +2543,7 @@
           <a:p>
             <a:fld id="{E6F0475F-9040-4CC5-8405-AE9948145E03}" type="datetimeFigureOut">
               <a:rPr lang="de-DE" smtClean="0"/>
-              <a:t>05.01.2017</a:t>
+              <a:t>07.01.2017</a:t>
             </a:fld>
             <a:endParaRPr lang="de-DE"/>
           </a:p>
@@ -2994,10 +2973,34 @@
                 <a:tableStyleId>{2D5ABB26-0587-4C30-8999-92F81FD0307C}</a:tableStyleId>
               </a:tblPr>
               <a:tblGrid>
-                <a:gridCol w="2200443"/>
-                <a:gridCol w="2200443"/>
-                <a:gridCol w="2200443"/>
-                <a:gridCol w="2200443"/>
+                <a:gridCol w="2200443">
+                  <a:extLst>
+                    <a:ext uri="{9D8B030D-6E8A-4147-A177-3AD203B41FA5}">
+                      <a16:colId xmlns:a16="http://schemas.microsoft.com/office/drawing/2014/main" val="20000"/>
+                    </a:ext>
+                  </a:extLst>
+                </a:gridCol>
+                <a:gridCol w="2200443">
+                  <a:extLst>
+                    <a:ext uri="{9D8B030D-6E8A-4147-A177-3AD203B41FA5}">
+                      <a16:colId xmlns:a16="http://schemas.microsoft.com/office/drawing/2014/main" val="20001"/>
+                    </a:ext>
+                  </a:extLst>
+                </a:gridCol>
+                <a:gridCol w="2200443">
+                  <a:extLst>
+                    <a:ext uri="{9D8B030D-6E8A-4147-A177-3AD203B41FA5}">
+                      <a16:colId xmlns:a16="http://schemas.microsoft.com/office/drawing/2014/main" val="20002"/>
+                    </a:ext>
+                  </a:extLst>
+                </a:gridCol>
+                <a:gridCol w="2200443">
+                  <a:extLst>
+                    <a:ext uri="{9D8B030D-6E8A-4147-A177-3AD203B41FA5}">
+                      <a16:colId xmlns:a16="http://schemas.microsoft.com/office/drawing/2014/main" val="20003"/>
+                    </a:ext>
+                  </a:extLst>
+                </a:gridCol>
               </a:tblGrid>
               <a:tr h="1217622">
                 <a:tc>
@@ -3212,6 +3215,11 @@
                     </a:solidFill>
                   </a:tcPr>
                 </a:tc>
+                <a:extLst>
+                  <a:ext uri="{0D108BD9-81ED-4DB2-BD59-A6C34878D82A}">
+                    <a16:rowId xmlns:a16="http://schemas.microsoft.com/office/drawing/2014/main" val="10000"/>
+                  </a:ext>
+                </a:extLst>
               </a:tr>
               <a:tr h="1217622">
                 <a:tc>
@@ -3426,6 +3434,11 @@
                     </a:solidFill>
                   </a:tcPr>
                 </a:tc>
+                <a:extLst>
+                  <a:ext uri="{0D108BD9-81ED-4DB2-BD59-A6C34878D82A}">
+                    <a16:rowId xmlns:a16="http://schemas.microsoft.com/office/drawing/2014/main" val="10001"/>
+                  </a:ext>
+                </a:extLst>
               </a:tr>
               <a:tr h="1217622">
                 <a:tc>
@@ -3640,6 +3653,11 @@
                     </a:solidFill>
                   </a:tcPr>
                 </a:tc>
+                <a:extLst>
+                  <a:ext uri="{0D108BD9-81ED-4DB2-BD59-A6C34878D82A}">
+                    <a16:rowId xmlns:a16="http://schemas.microsoft.com/office/drawing/2014/main" val="10002"/>
+                  </a:ext>
+                </a:extLst>
               </a:tr>
               <a:tr h="1217622">
                 <a:tc>
@@ -3854,6 +3872,11 @@
                     </a:solidFill>
                   </a:tcPr>
                 </a:tc>
+                <a:extLst>
+                  <a:ext uri="{0D108BD9-81ED-4DB2-BD59-A6C34878D82A}">
+                    <a16:rowId xmlns:a16="http://schemas.microsoft.com/office/drawing/2014/main" val="10003"/>
+                  </a:ext>
+                </a:extLst>
               </a:tr>
             </a:tbl>
           </a:graphicData>
@@ -4113,7 +4136,7 @@
           <a:lstStyle/>
           <a:p>
             <a:r>
-              <a:rPr lang="de-DE" smtClean="0"/>
+              <a:rPr lang="de-DE"/>
               <a:t>17.10.16</a:t>
             </a:r>
           </a:p>
@@ -4142,10 +4165,9 @@
           <a:lstStyle/>
           <a:p>
             <a:r>
-              <a:rPr lang="de-DE" smtClean="0"/>
+              <a:rPr lang="de-DE"/>
               <a:t>01.11.16</a:t>
             </a:r>
-            <a:endParaRPr lang="de-DE"/>
           </a:p>
         </p:txBody>
       </p:sp>
@@ -4172,10 +4194,9 @@
           <a:lstStyle/>
           <a:p>
             <a:r>
-              <a:rPr lang="de-DE" smtClean="0"/>
+              <a:rPr lang="de-DE"/>
               <a:t>01.12.16</a:t>
             </a:r>
-            <a:endParaRPr lang="de-DE"/>
           </a:p>
         </p:txBody>
       </p:sp>
@@ -4202,10 +4223,9 @@
           <a:lstStyle/>
           <a:p>
             <a:r>
-              <a:rPr lang="de-DE" smtClean="0"/>
+              <a:rPr lang="de-DE"/>
               <a:t>01.01.17</a:t>
             </a:r>
-            <a:endParaRPr lang="de-DE"/>
           </a:p>
         </p:txBody>
       </p:sp>
@@ -4232,10 +4252,9 @@
           <a:lstStyle/>
           <a:p>
             <a:r>
-              <a:rPr lang="de-DE" smtClean="0"/>
+              <a:rPr lang="de-DE"/>
               <a:t>10.02.17</a:t>
             </a:r>
-            <a:endParaRPr lang="de-DE"/>
           </a:p>
         </p:txBody>
       </p:sp>
@@ -4300,10 +4319,9 @@
           <a:p>
             <a:pPr algn="ctr"/>
             <a:r>
-              <a:rPr lang="de-DE" sz="2000" b="1" smtClean="0"/>
+              <a:rPr lang="de-DE" sz="2000" b="1"/>
               <a:t>Meilenstein-Termine</a:t>
             </a:r>
-            <a:endParaRPr lang="de-DE" sz="2000" b="1"/>
           </a:p>
         </p:txBody>
       </p:sp>
@@ -4344,10 +4362,9 @@
             <a:lstStyle/>
             <a:p>
               <a:r>
-                <a:rPr lang="de-DE" smtClean="0"/>
+                <a:rPr lang="de-DE"/>
                 <a:t>17.10.16</a:t>
               </a:r>
-              <a:endParaRPr lang="de-DE"/>
             </a:p>
           </p:txBody>
         </p:sp>
@@ -4374,10 +4391,9 @@
             <a:lstStyle/>
             <a:p>
               <a:r>
-                <a:rPr lang="de-DE" smtClean="0"/>
+                <a:rPr lang="de-DE"/>
                 <a:t>01.11.16</a:t>
               </a:r>
-              <a:endParaRPr lang="de-DE"/>
             </a:p>
           </p:txBody>
         </p:sp>
@@ -4404,10 +4420,9 @@
             <a:lstStyle/>
             <a:p>
               <a:r>
-                <a:rPr lang="de-DE" smtClean="0"/>
+                <a:rPr lang="de-DE"/>
                 <a:t>01.12.16</a:t>
               </a:r>
-              <a:endParaRPr lang="de-DE"/>
             </a:p>
           </p:txBody>
         </p:sp>
@@ -4434,10 +4449,9 @@
             <a:lstStyle/>
             <a:p>
               <a:r>
-                <a:rPr lang="de-DE" smtClean="0"/>
+                <a:rPr lang="de-DE"/>
                 <a:t>01.01.17</a:t>
               </a:r>
-              <a:endParaRPr lang="de-DE"/>
             </a:p>
           </p:txBody>
         </p:sp>
@@ -4464,10 +4478,9 @@
             <a:lstStyle/>
             <a:p>
               <a:r>
-                <a:rPr lang="de-DE" smtClean="0"/>
+                <a:rPr lang="de-DE"/>
                 <a:t>10.02.17</a:t>
               </a:r>
-              <a:endParaRPr lang="de-DE"/>
             </a:p>
           </p:txBody>
         </p:sp>
@@ -4533,7 +4546,7 @@
             <a:lstStyle/>
             <a:p>
               <a:r>
-                <a:rPr lang="de-DE" sz="2000" b="1" smtClean="0"/>
+                <a:rPr lang="de-DE" sz="2000" b="1"/>
                 <a:t>Berichtszeitpunkt</a:t>
               </a:r>
               <a:endParaRPr lang="de-DE" b="1"/>
@@ -4565,10 +4578,9 @@
           <a:p>
             <a:pPr algn="ctr"/>
             <a:r>
-              <a:rPr lang="de-DE" sz="3600" b="1" u="sng" smtClean="0"/>
+              <a:rPr lang="de-DE" sz="3600" b="1" u="sng"/>
               <a:t>Meilensteintrendanalyse</a:t>
             </a:r>
-            <a:endParaRPr lang="de-DE" sz="3600" b="1" u="sng"/>
           </a:p>
         </p:txBody>
       </p:sp>
@@ -4905,6 +4917,84 @@
           </a:fontRef>
         </p:style>
       </p:cxnSp>
+      <p:cxnSp>
+        <p:nvCxnSpPr>
+          <p:cNvPr id="41" name="Gerader Verbinder 2"/>
+          <p:cNvCxnSpPr>
+            <a:cxnSpLocks/>
+          </p:cNvCxnSpPr>
+          <p:nvPr/>
+        </p:nvCxnSpPr>
+        <p:spPr>
+          <a:xfrm>
+            <a:off x="9458701" y="1742233"/>
+            <a:ext cx="1950704" cy="110"/>
+          </a:xfrm>
+          <a:prstGeom prst="straightConnector1">
+            <a:avLst/>
+          </a:prstGeom>
+          <a:ln w="25400">
+            <a:solidFill>
+              <a:schemeClr val="tx1"/>
+            </a:solidFill>
+            <a:headEnd type="diamond" w="lg" len="lg"/>
+            <a:tailEnd type="diamond" w="lg" len="lg"/>
+          </a:ln>
+        </p:spPr>
+        <p:style>
+          <a:lnRef idx="1">
+            <a:schemeClr val="accent1"/>
+          </a:lnRef>
+          <a:fillRef idx="0">
+            <a:schemeClr val="accent1"/>
+          </a:fillRef>
+          <a:effectRef idx="0">
+            <a:schemeClr val="accent1"/>
+          </a:effectRef>
+          <a:fontRef idx="minor">
+            <a:schemeClr val="tx1"/>
+          </a:fontRef>
+        </p:style>
+      </p:cxnSp>
+      <p:cxnSp>
+        <p:nvCxnSpPr>
+          <p:cNvPr id="42" name="Gerader Verbinder 2"/>
+          <p:cNvCxnSpPr>
+            <a:cxnSpLocks/>
+          </p:cNvCxnSpPr>
+          <p:nvPr/>
+        </p:nvCxnSpPr>
+        <p:spPr>
+          <a:xfrm>
+            <a:off x="9458701" y="2550159"/>
+            <a:ext cx="501099" cy="426"/>
+          </a:xfrm>
+          <a:prstGeom prst="straightConnector1">
+            <a:avLst/>
+          </a:prstGeom>
+          <a:ln w="25400">
+            <a:solidFill>
+              <a:schemeClr val="tx1"/>
+            </a:solidFill>
+            <a:headEnd type="diamond" w="lg" len="lg"/>
+            <a:tailEnd type="diamond" w="lg" len="lg"/>
+          </a:ln>
+        </p:spPr>
+        <p:style>
+          <a:lnRef idx="1">
+            <a:schemeClr val="accent1"/>
+          </a:lnRef>
+          <a:fillRef idx="0">
+            <a:schemeClr val="accent1"/>
+          </a:fillRef>
+          <a:effectRef idx="0">
+            <a:schemeClr val="accent1"/>
+          </a:effectRef>
+          <a:fontRef idx="minor">
+            <a:schemeClr val="tx1"/>
+          </a:fontRef>
+        </p:style>
+      </p:cxnSp>
     </p:spTree>
     <p:extLst>
       <p:ext uri="{BB962C8B-B14F-4D97-AF65-F5344CB8AC3E}">
@@ -4915,13 +5005,6 @@
   <p:clrMapOvr>
     <a:masterClrMapping/>
   </p:clrMapOvr>
-  <p:timing>
-    <p:tnLst>
-      <p:par>
-        <p:cTn id="1" dur="indefinite" restart="never" nodeType="tmRoot"/>
-      </p:par>
-    </p:tnLst>
-  </p:timing>
 </p:sld>
 </file>
 

</xml_diff>